<commit_message>
Update deck, generate pdf
</commit_message>
<xml_diff>
--- a/doc/deck.pptx
+++ b/doc/deck.pptx
@@ -111,6 +111,11 @@
       </a:defRPr>
     </a:lvl9pPr>
   </p:defaultTextStyle>
+  <p:extLst>
+    <p:ext uri="{EFAFB233-063F-42B5-8137-9DF3F51BA10A}">
+      <p15:sldGuideLst xmlns:p15="http://schemas.microsoft.com/office/powerpoint/2012/main"/>
+    </p:ext>
+  </p:extLst>
 </p:presentation>
 </file>
 
@@ -5784,6 +5789,45 @@
             <p:ph type="ctrTitle"/>
           </p:nvPr>
         </p:nvSpPr>
+        <p:spPr>
+          <a:xfrm>
+            <a:off x="898358" y="2404534"/>
+            <a:ext cx="8375645" cy="1646302"/>
+          </a:xfrm>
+        </p:spPr>
+        <p:txBody>
+          <a:bodyPr/>
+          <a:lstStyle/>
+          <a:p>
+            <a:r>
+              <a:rPr lang="en-US" dirty="0" smtClean="0"/>
+              <a:t>Event-driven architecture</a:t>
+            </a:r>
+            <a:br>
+              <a:rPr lang="en-US" dirty="0" smtClean="0"/>
+            </a:br>
+            <a:r>
+              <a:rPr lang="en-US" dirty="0" smtClean="0"/>
+              <a:t>for a 12-factor </a:t>
+            </a:r>
+            <a:r>
+              <a:rPr lang="en-US" dirty="0" smtClean="0"/>
+              <a:t>app</a:t>
+            </a:r>
+            <a:endParaRPr lang="en-US" dirty="0"/>
+          </a:p>
+        </p:txBody>
+      </p:sp>
+      <p:sp>
+        <p:nvSpPr>
+          <p:cNvPr id="3" name="Subtitle 2"/>
+          <p:cNvSpPr>
+            <a:spLocks noGrp="1"/>
+          </p:cNvSpPr>
+          <p:nvPr>
+            <p:ph type="subTitle" idx="1"/>
+          </p:nvPr>
+        </p:nvSpPr>
         <p:spPr/>
         <p:txBody>
           <a:bodyPr/>
@@ -5791,38 +5835,19 @@
           <a:p>
             <a:r>
               <a:rPr lang="en-US" dirty="0" smtClean="0"/>
-              <a:t>Event-driven </a:t>
-            </a:r>
-            <a:r>
-              <a:rPr lang="en-US" dirty="0"/>
-              <a:t>architecture </a:t>
+              <a:t>How the event-driven architecture fits </a:t>
+            </a:r>
+            <a:r>
+              <a:rPr lang="en-US" dirty="0" err="1" smtClean="0"/>
+              <a:t>intothe</a:t>
             </a:r>
             <a:r>
               <a:rPr lang="en-US" dirty="0" smtClean="0"/>
-              <a:t>for a 12-factor app</a:t>
-            </a:r>
-            <a:endParaRPr lang="en-US" dirty="0"/>
-          </a:p>
-        </p:txBody>
-      </p:sp>
-      <p:sp>
-        <p:nvSpPr>
-          <p:cNvPr id="3" name="Subtitle 2"/>
-          <p:cNvSpPr>
-            <a:spLocks noGrp="1"/>
-          </p:cNvSpPr>
-          <p:nvPr>
-            <p:ph type="subTitle" idx="1"/>
-          </p:nvPr>
-        </p:nvSpPr>
-        <p:spPr/>
-        <p:txBody>
-          <a:bodyPr/>
-          <a:lstStyle/>
-          <a:p>
+              <a:t> </a:t>
+            </a:r>
             <a:r>
               <a:rPr lang="en-US" dirty="0" smtClean="0"/>
-              <a:t>How the event-driven architecture fits into the “</a:t>
+              <a:t>“</a:t>
             </a:r>
             <a:r>
               <a:rPr lang="en-US" dirty="0"/>
@@ -5919,27 +5944,50 @@
           <a:lstStyle/>
           <a:p>
             <a:r>
+              <a:rPr lang="en-US" dirty="0"/>
+              <a:t>H</a:t>
+            </a:r>
+            <a:r>
               <a:rPr lang="en-US" dirty="0" smtClean="0"/>
-              <a:t>A husband</a:t>
-            </a:r>
-          </a:p>
-          <a:p>
+              <a:t>usband</a:t>
+            </a:r>
+            <a:endParaRPr lang="en-US" dirty="0" smtClean="0"/>
+          </a:p>
+          <a:p>
+            <a:r>
+              <a:rPr lang="en-US" dirty="0"/>
+              <a:t>F</a:t>
+            </a:r>
             <a:r>
               <a:rPr lang="en-US" dirty="0" smtClean="0"/>
-              <a:t>A father</a:t>
-            </a:r>
-          </a:p>
-          <a:p>
+              <a:t>ather</a:t>
+            </a:r>
+            <a:endParaRPr lang="en-US" dirty="0" smtClean="0"/>
+          </a:p>
+          <a:p>
+            <a:r>
+              <a:rPr lang="en-US" dirty="0"/>
+              <a:t>S</a:t>
+            </a:r>
             <a:r>
               <a:rPr lang="en-US" dirty="0" smtClean="0"/>
-              <a:t>A software engineer</a:t>
-            </a:r>
-          </a:p>
-          <a:p>
+              <a:t>oftware </a:t>
+            </a:r>
             <a:r>
               <a:rPr lang="en-US" dirty="0" smtClean="0"/>
-              <a:t>A book worm</a:t>
-            </a:r>
+              <a:t>engineer</a:t>
+            </a:r>
+          </a:p>
+          <a:p>
+            <a:r>
+              <a:rPr lang="en-US" smtClean="0"/>
+              <a:t>B</a:t>
+            </a:r>
+            <a:r>
+              <a:rPr lang="en-US" smtClean="0"/>
+              <a:t>ookworm</a:t>
+            </a:r>
+            <a:endParaRPr lang="en-US" dirty="0" smtClean="0"/>
           </a:p>
           <a:p>
             <a:pPr marL="0" indent="0" algn="r">

</xml_diff>